<commit_message>
Doc update. Closes #125 and closes #135
</commit_message>
<xml_diff>
--- a/jqm-all/jqm-doc/src/site/sphinx/files/schemas.pptx
+++ b/jqm-all/jqm-doc/src/site/sphinx/files/schemas.pptx
@@ -6,6 +6,7 @@
   </p:sldMasterIdLst>
   <p:sldIdLst>
     <p:sldId id="256" r:id="rId2"/>
+    <p:sldId id="257" r:id="rId3"/>
   </p:sldIdLst>
   <p:sldSz cx="12192000" cy="6858000"/>
   <p:notesSz cx="6858000" cy="9144000"/>
@@ -104,6 +105,11 @@
       </a:defRPr>
     </a:lvl9pPr>
   </p:defaultTextStyle>
+  <p:extLst>
+    <p:ext uri="{EFAFB233-063F-42B5-8137-9DF3F51BA10A}">
+      <p15:sldGuideLst xmlns:p15="http://schemas.microsoft.com/office/powerpoint/2012/main"/>
+    </p:ext>
+  </p:extLst>
 </p:presentation>
 </file>
 
@@ -238,7 +244,7 @@
           <a:p>
             <a:fld id="{2EBAB665-FDAC-4018-B6BF-0BAA815CD983}" type="datetimeFigureOut">
               <a:rPr lang="fr-FR" smtClean="0"/>
-              <a:t>08/02/2014</a:t>
+              <a:t>26/10/2014</a:t>
             </a:fld>
             <a:endParaRPr lang="fr-FR"/>
           </a:p>
@@ -408,7 +414,7 @@
           <a:p>
             <a:fld id="{2EBAB665-FDAC-4018-B6BF-0BAA815CD983}" type="datetimeFigureOut">
               <a:rPr lang="fr-FR" smtClean="0"/>
-              <a:t>08/02/2014</a:t>
+              <a:t>26/10/2014</a:t>
             </a:fld>
             <a:endParaRPr lang="fr-FR"/>
           </a:p>
@@ -588,7 +594,7 @@
           <a:p>
             <a:fld id="{2EBAB665-FDAC-4018-B6BF-0BAA815CD983}" type="datetimeFigureOut">
               <a:rPr lang="fr-FR" smtClean="0"/>
-              <a:t>08/02/2014</a:t>
+              <a:t>26/10/2014</a:t>
             </a:fld>
             <a:endParaRPr lang="fr-FR"/>
           </a:p>
@@ -758,7 +764,7 @@
           <a:p>
             <a:fld id="{2EBAB665-FDAC-4018-B6BF-0BAA815CD983}" type="datetimeFigureOut">
               <a:rPr lang="fr-FR" smtClean="0"/>
-              <a:t>08/02/2014</a:t>
+              <a:t>26/10/2014</a:t>
             </a:fld>
             <a:endParaRPr lang="fr-FR"/>
           </a:p>
@@ -1004,7 +1010,7 @@
           <a:p>
             <a:fld id="{2EBAB665-FDAC-4018-B6BF-0BAA815CD983}" type="datetimeFigureOut">
               <a:rPr lang="fr-FR" smtClean="0"/>
-              <a:t>08/02/2014</a:t>
+              <a:t>26/10/2014</a:t>
             </a:fld>
             <a:endParaRPr lang="fr-FR"/>
           </a:p>
@@ -1236,7 +1242,7 @@
           <a:p>
             <a:fld id="{2EBAB665-FDAC-4018-B6BF-0BAA815CD983}" type="datetimeFigureOut">
               <a:rPr lang="fr-FR" smtClean="0"/>
-              <a:t>08/02/2014</a:t>
+              <a:t>26/10/2014</a:t>
             </a:fld>
             <a:endParaRPr lang="fr-FR"/>
           </a:p>
@@ -1603,7 +1609,7 @@
           <a:p>
             <a:fld id="{2EBAB665-FDAC-4018-B6BF-0BAA815CD983}" type="datetimeFigureOut">
               <a:rPr lang="fr-FR" smtClean="0"/>
-              <a:t>08/02/2014</a:t>
+              <a:t>26/10/2014</a:t>
             </a:fld>
             <a:endParaRPr lang="fr-FR"/>
           </a:p>
@@ -1721,7 +1727,7 @@
           <a:p>
             <a:fld id="{2EBAB665-FDAC-4018-B6BF-0BAA815CD983}" type="datetimeFigureOut">
               <a:rPr lang="fr-FR" smtClean="0"/>
-              <a:t>08/02/2014</a:t>
+              <a:t>26/10/2014</a:t>
             </a:fld>
             <a:endParaRPr lang="fr-FR"/>
           </a:p>
@@ -1816,7 +1822,7 @@
           <a:p>
             <a:fld id="{2EBAB665-FDAC-4018-B6BF-0BAA815CD983}" type="datetimeFigureOut">
               <a:rPr lang="fr-FR" smtClean="0"/>
-              <a:t>08/02/2014</a:t>
+              <a:t>26/10/2014</a:t>
             </a:fld>
             <a:endParaRPr lang="fr-FR"/>
           </a:p>
@@ -2093,7 +2099,7 @@
           <a:p>
             <a:fld id="{2EBAB665-FDAC-4018-B6BF-0BAA815CD983}" type="datetimeFigureOut">
               <a:rPr lang="fr-FR" smtClean="0"/>
-              <a:t>08/02/2014</a:t>
+              <a:t>26/10/2014</a:t>
             </a:fld>
             <a:endParaRPr lang="fr-FR"/>
           </a:p>
@@ -2346,7 +2352,7 @@
           <a:p>
             <a:fld id="{2EBAB665-FDAC-4018-B6BF-0BAA815CD983}" type="datetimeFigureOut">
               <a:rPr lang="fr-FR" smtClean="0"/>
-              <a:t>08/02/2014</a:t>
+              <a:t>26/10/2014</a:t>
             </a:fld>
             <a:endParaRPr lang="fr-FR"/>
           </a:p>
@@ -2559,7 +2565,7 @@
           <a:p>
             <a:fld id="{2EBAB665-FDAC-4018-B6BF-0BAA815CD983}" type="datetimeFigureOut">
               <a:rPr lang="fr-FR" smtClean="0"/>
-              <a:t>08/02/2014</a:t>
+              <a:t>26/10/2014</a:t>
             </a:fld>
             <a:endParaRPr lang="fr-FR"/>
           </a:p>
@@ -3069,7 +3075,6 @@
               <a:rPr lang="fr-FR" sz="800" dirty="0" smtClean="0"/>
               <a:t>…</a:t>
             </a:r>
-            <a:endParaRPr lang="fr-FR" sz="800" dirty="0" smtClean="0"/>
           </a:p>
         </p:txBody>
       </p:sp>
@@ -3305,11 +3310,7 @@
           <a:p>
             <a:r>
               <a:rPr lang="fr-FR" sz="800" dirty="0" err="1" smtClean="0"/>
-              <a:t>Enqueu</a:t>
-            </a:r>
-            <a:r>
-              <a:rPr lang="fr-FR" sz="800" dirty="0" err="1" smtClean="0"/>
-              <a:t>e</a:t>
+              <a:t>Enqueue</a:t>
             </a:r>
             <a:r>
               <a:rPr lang="fr-FR" sz="800" dirty="0" smtClean="0"/>
@@ -3343,7 +3344,6 @@
               <a:rPr lang="fr-FR" sz="800" dirty="0" smtClean="0"/>
               <a:t>…</a:t>
             </a:r>
-            <a:endParaRPr lang="fr-FR" sz="800" dirty="0" smtClean="0"/>
           </a:p>
         </p:txBody>
       </p:sp>
@@ -4059,6 +4059,791 @@
     <p:extLst>
       <p:ext uri="{BB962C8B-B14F-4D97-AF65-F5344CB8AC3E}">
         <p14:creationId xmlns:p14="http://schemas.microsoft.com/office/powerpoint/2010/main" val="3863786581"/>
+      </p:ext>
+    </p:extLst>
+  </p:cSld>
+  <p:clrMapOvr>
+    <a:masterClrMapping/>
+  </p:clrMapOvr>
+</p:sld>
+</file>
+
+<file path=ppt/slides/slide2.xml><?xml version="1.0" encoding="utf-8"?>
+<p:sld xmlns:a="http://schemas.openxmlformats.org/drawingml/2006/main" xmlns:r="http://schemas.openxmlformats.org/officeDocument/2006/relationships" xmlns:p="http://schemas.openxmlformats.org/presentationml/2006/main">
+  <p:cSld>
+    <p:spTree>
+      <p:nvGrpSpPr>
+        <p:cNvPr id="1" name=""/>
+        <p:cNvGrpSpPr/>
+        <p:nvPr/>
+      </p:nvGrpSpPr>
+      <p:grpSpPr>
+        <a:xfrm>
+          <a:off x="0" y="0"/>
+          <a:ext cx="0" cy="0"/>
+          <a:chOff x="0" y="0"/>
+          <a:chExt cx="0" cy="0"/>
+        </a:xfrm>
+      </p:grpSpPr>
+      <p:sp>
+        <p:nvSpPr>
+          <p:cNvPr id="2" name="Rectangle 1"/>
+          <p:cNvSpPr/>
+          <p:nvPr/>
+        </p:nvSpPr>
+        <p:spPr>
+          <a:xfrm>
+            <a:off x="125103" y="94268"/>
+            <a:ext cx="1750831" cy="1020569"/>
+          </a:xfrm>
+          <a:prstGeom prst="rect">
+            <a:avLst/>
+          </a:prstGeom>
+          <a:solidFill>
+            <a:schemeClr val="accent6">
+              <a:lumMod val="75000"/>
+            </a:schemeClr>
+          </a:solidFill>
+        </p:spPr>
+        <p:style>
+          <a:lnRef idx="2">
+            <a:schemeClr val="accent2">
+              <a:shade val="50000"/>
+            </a:schemeClr>
+          </a:lnRef>
+          <a:fillRef idx="1">
+            <a:schemeClr val="accent2"/>
+          </a:fillRef>
+          <a:effectRef idx="0">
+            <a:schemeClr val="accent2"/>
+          </a:effectRef>
+          <a:fontRef idx="minor">
+            <a:schemeClr val="lt1"/>
+          </a:fontRef>
+        </p:style>
+        <p:txBody>
+          <a:bodyPr rtlCol="0" anchor="t"/>
+          <a:lstStyle/>
+          <a:p>
+            <a:pPr algn="ctr"/>
+            <a:r>
+              <a:rPr lang="fr-FR" dirty="0" smtClean="0"/>
+              <a:t>JQM Engine 1</a:t>
+            </a:r>
+            <a:endParaRPr lang="fr-FR" dirty="0"/>
+          </a:p>
+        </p:txBody>
+      </p:sp>
+      <p:sp>
+        <p:nvSpPr>
+          <p:cNvPr id="4" name="Cylindre 3"/>
+          <p:cNvSpPr/>
+          <p:nvPr/>
+        </p:nvSpPr>
+        <p:spPr>
+          <a:xfrm>
+            <a:off x="2245982" y="1763151"/>
+            <a:ext cx="1803382" cy="2146430"/>
+          </a:xfrm>
+          <a:prstGeom prst="can">
+            <a:avLst/>
+          </a:prstGeom>
+          <a:solidFill>
+            <a:schemeClr val="accent6">
+              <a:lumMod val="75000"/>
+            </a:schemeClr>
+          </a:solidFill>
+        </p:spPr>
+        <p:style>
+          <a:lnRef idx="2">
+            <a:schemeClr val="accent1">
+              <a:shade val="50000"/>
+            </a:schemeClr>
+          </a:lnRef>
+          <a:fillRef idx="1">
+            <a:schemeClr val="accent1"/>
+          </a:fillRef>
+          <a:effectRef idx="0">
+            <a:schemeClr val="accent1"/>
+          </a:effectRef>
+          <a:fontRef idx="minor">
+            <a:schemeClr val="lt1"/>
+          </a:fontRef>
+        </p:style>
+        <p:txBody>
+          <a:bodyPr rtlCol="0" anchor="b"/>
+          <a:lstStyle/>
+          <a:p>
+            <a:pPr algn="ctr"/>
+            <a:r>
+              <a:rPr lang="fr-FR" dirty="0" smtClean="0"/>
+              <a:t>JQM </a:t>
+            </a:r>
+            <a:r>
+              <a:rPr lang="fr-FR" dirty="0" err="1" smtClean="0"/>
+              <a:t>database</a:t>
+            </a:r>
+            <a:endParaRPr lang="fr-FR" dirty="0"/>
+          </a:p>
+        </p:txBody>
+      </p:sp>
+      <p:sp>
+        <p:nvSpPr>
+          <p:cNvPr id="6" name="Organigramme : Multidocument 5"/>
+          <p:cNvSpPr/>
+          <p:nvPr/>
+        </p:nvSpPr>
+        <p:spPr>
+          <a:xfrm>
+            <a:off x="2403834" y="2224726"/>
+            <a:ext cx="339365" cy="743616"/>
+          </a:xfrm>
+          <a:prstGeom prst="flowChartMultidocument">
+            <a:avLst/>
+          </a:prstGeom>
+        </p:spPr>
+        <p:style>
+          <a:lnRef idx="2">
+            <a:schemeClr val="accent1">
+              <a:shade val="50000"/>
+            </a:schemeClr>
+          </a:lnRef>
+          <a:fillRef idx="1">
+            <a:schemeClr val="accent1"/>
+          </a:fillRef>
+          <a:effectRef idx="0">
+            <a:schemeClr val="accent1"/>
+          </a:effectRef>
+          <a:fontRef idx="minor">
+            <a:schemeClr val="lt1"/>
+          </a:fontRef>
+        </p:style>
+        <p:txBody>
+          <a:bodyPr rtlCol="0" anchor="ctr"/>
+          <a:lstStyle/>
+          <a:p>
+            <a:pPr algn="ctr"/>
+            <a:endParaRPr lang="fr-FR" dirty="0"/>
+          </a:p>
+        </p:txBody>
+      </p:sp>
+      <p:sp>
+        <p:nvSpPr>
+          <p:cNvPr id="7" name="ZoneTexte 6"/>
+          <p:cNvSpPr txBox="1"/>
+          <p:nvPr/>
+        </p:nvSpPr>
+        <p:spPr>
+          <a:xfrm>
+            <a:off x="2403834" y="2930997"/>
+            <a:ext cx="593889" cy="369332"/>
+          </a:xfrm>
+          <a:prstGeom prst="rect">
+            <a:avLst/>
+          </a:prstGeom>
+          <a:noFill/>
+        </p:spPr>
+        <p:txBody>
+          <a:bodyPr wrap="square" rtlCol="0">
+            <a:spAutoFit/>
+          </a:bodyPr>
+          <a:lstStyle/>
+          <a:p>
+            <a:r>
+              <a:rPr lang="fr-FR" dirty="0" smtClean="0"/>
+              <a:t>Q1</a:t>
+            </a:r>
+            <a:endParaRPr lang="fr-FR" dirty="0"/>
+          </a:p>
+        </p:txBody>
+      </p:sp>
+      <p:sp>
+        <p:nvSpPr>
+          <p:cNvPr id="8" name="Organigramme : Multidocument 7"/>
+          <p:cNvSpPr/>
+          <p:nvPr/>
+        </p:nvSpPr>
+        <p:spPr>
+          <a:xfrm>
+            <a:off x="2977990" y="2224726"/>
+            <a:ext cx="339365" cy="743616"/>
+          </a:xfrm>
+          <a:prstGeom prst="flowChartMultidocument">
+            <a:avLst/>
+          </a:prstGeom>
+        </p:spPr>
+        <p:style>
+          <a:lnRef idx="2">
+            <a:schemeClr val="accent1">
+              <a:shade val="50000"/>
+            </a:schemeClr>
+          </a:lnRef>
+          <a:fillRef idx="1">
+            <a:schemeClr val="accent1"/>
+          </a:fillRef>
+          <a:effectRef idx="0">
+            <a:schemeClr val="accent1"/>
+          </a:effectRef>
+          <a:fontRef idx="minor">
+            <a:schemeClr val="lt1"/>
+          </a:fontRef>
+        </p:style>
+        <p:txBody>
+          <a:bodyPr rtlCol="0" anchor="ctr"/>
+          <a:lstStyle/>
+          <a:p>
+            <a:pPr algn="ctr"/>
+            <a:endParaRPr lang="fr-FR" dirty="0"/>
+          </a:p>
+        </p:txBody>
+      </p:sp>
+      <p:sp>
+        <p:nvSpPr>
+          <p:cNvPr id="9" name="Organigramme : Multidocument 8"/>
+          <p:cNvSpPr/>
+          <p:nvPr/>
+        </p:nvSpPr>
+        <p:spPr>
+          <a:xfrm>
+            <a:off x="3552146" y="2224726"/>
+            <a:ext cx="339365" cy="743616"/>
+          </a:xfrm>
+          <a:prstGeom prst="flowChartMultidocument">
+            <a:avLst/>
+          </a:prstGeom>
+        </p:spPr>
+        <p:style>
+          <a:lnRef idx="2">
+            <a:schemeClr val="accent1">
+              <a:shade val="50000"/>
+            </a:schemeClr>
+          </a:lnRef>
+          <a:fillRef idx="1">
+            <a:schemeClr val="accent1"/>
+          </a:fillRef>
+          <a:effectRef idx="0">
+            <a:schemeClr val="accent1"/>
+          </a:effectRef>
+          <a:fontRef idx="minor">
+            <a:schemeClr val="lt1"/>
+          </a:fontRef>
+        </p:style>
+        <p:txBody>
+          <a:bodyPr rtlCol="0" anchor="ctr"/>
+          <a:lstStyle/>
+          <a:p>
+            <a:pPr algn="ctr"/>
+            <a:endParaRPr lang="fr-FR" dirty="0"/>
+          </a:p>
+        </p:txBody>
+      </p:sp>
+      <p:sp>
+        <p:nvSpPr>
+          <p:cNvPr id="10" name="ZoneTexte 9"/>
+          <p:cNvSpPr txBox="1"/>
+          <p:nvPr/>
+        </p:nvSpPr>
+        <p:spPr>
+          <a:xfrm>
+            <a:off x="2901051" y="2930997"/>
+            <a:ext cx="593889" cy="369332"/>
+          </a:xfrm>
+          <a:prstGeom prst="rect">
+            <a:avLst/>
+          </a:prstGeom>
+          <a:noFill/>
+        </p:spPr>
+        <p:txBody>
+          <a:bodyPr wrap="square" rtlCol="0">
+            <a:spAutoFit/>
+          </a:bodyPr>
+          <a:lstStyle/>
+          <a:p>
+            <a:r>
+              <a:rPr lang="fr-FR" dirty="0" smtClean="0"/>
+              <a:t>Q2</a:t>
+            </a:r>
+            <a:endParaRPr lang="fr-FR" dirty="0"/>
+          </a:p>
+        </p:txBody>
+      </p:sp>
+      <p:sp>
+        <p:nvSpPr>
+          <p:cNvPr id="11" name="ZoneTexte 10"/>
+          <p:cNvSpPr txBox="1"/>
+          <p:nvPr/>
+        </p:nvSpPr>
+        <p:spPr>
+          <a:xfrm>
+            <a:off x="3455475" y="2941010"/>
+            <a:ext cx="593889" cy="369332"/>
+          </a:xfrm>
+          <a:prstGeom prst="rect">
+            <a:avLst/>
+          </a:prstGeom>
+          <a:noFill/>
+        </p:spPr>
+        <p:txBody>
+          <a:bodyPr wrap="square" rtlCol="0">
+            <a:spAutoFit/>
+          </a:bodyPr>
+          <a:lstStyle/>
+          <a:p>
+            <a:r>
+              <a:rPr lang="fr-FR" dirty="0" smtClean="0"/>
+              <a:t>Q3</a:t>
+            </a:r>
+            <a:endParaRPr lang="fr-FR" dirty="0"/>
+          </a:p>
+        </p:txBody>
+      </p:sp>
+      <p:sp>
+        <p:nvSpPr>
+          <p:cNvPr id="12" name="Rectangle 11"/>
+          <p:cNvSpPr/>
+          <p:nvPr/>
+        </p:nvSpPr>
+        <p:spPr>
+          <a:xfrm>
+            <a:off x="2322579" y="94267"/>
+            <a:ext cx="1750831" cy="1020569"/>
+          </a:xfrm>
+          <a:prstGeom prst="rect">
+            <a:avLst/>
+          </a:prstGeom>
+          <a:solidFill>
+            <a:schemeClr val="accent6">
+              <a:lumMod val="75000"/>
+            </a:schemeClr>
+          </a:solidFill>
+        </p:spPr>
+        <p:style>
+          <a:lnRef idx="2">
+            <a:schemeClr val="accent2">
+              <a:shade val="50000"/>
+            </a:schemeClr>
+          </a:lnRef>
+          <a:fillRef idx="1">
+            <a:schemeClr val="accent2"/>
+          </a:fillRef>
+          <a:effectRef idx="0">
+            <a:schemeClr val="accent2"/>
+          </a:effectRef>
+          <a:fontRef idx="minor">
+            <a:schemeClr val="lt1"/>
+          </a:fontRef>
+        </p:style>
+        <p:txBody>
+          <a:bodyPr rtlCol="0" anchor="t"/>
+          <a:lstStyle/>
+          <a:p>
+            <a:pPr algn="ctr"/>
+            <a:r>
+              <a:rPr lang="fr-FR" dirty="0" smtClean="0"/>
+              <a:t>JQM Engine </a:t>
+            </a:r>
+            <a:r>
+              <a:rPr lang="fr-FR" dirty="0"/>
+              <a:t>2</a:t>
+            </a:r>
+          </a:p>
+        </p:txBody>
+      </p:sp>
+      <p:sp>
+        <p:nvSpPr>
+          <p:cNvPr id="13" name="Rectangle 12"/>
+          <p:cNvSpPr/>
+          <p:nvPr/>
+        </p:nvSpPr>
+        <p:spPr>
+          <a:xfrm>
+            <a:off x="4520055" y="94266"/>
+            <a:ext cx="1750831" cy="1020569"/>
+          </a:xfrm>
+          <a:prstGeom prst="rect">
+            <a:avLst/>
+          </a:prstGeom>
+          <a:solidFill>
+            <a:schemeClr val="accent6">
+              <a:lumMod val="75000"/>
+            </a:schemeClr>
+          </a:solidFill>
+        </p:spPr>
+        <p:style>
+          <a:lnRef idx="2">
+            <a:schemeClr val="accent2">
+              <a:shade val="50000"/>
+            </a:schemeClr>
+          </a:lnRef>
+          <a:fillRef idx="1">
+            <a:schemeClr val="accent2"/>
+          </a:fillRef>
+          <a:effectRef idx="0">
+            <a:schemeClr val="accent2"/>
+          </a:effectRef>
+          <a:fontRef idx="minor">
+            <a:schemeClr val="lt1"/>
+          </a:fontRef>
+        </p:style>
+        <p:txBody>
+          <a:bodyPr rtlCol="0" anchor="t"/>
+          <a:lstStyle/>
+          <a:p>
+            <a:pPr algn="ctr"/>
+            <a:r>
+              <a:rPr lang="fr-FR" dirty="0" smtClean="0"/>
+              <a:t>JQM Engine </a:t>
+            </a:r>
+            <a:r>
+              <a:rPr lang="fr-FR" dirty="0"/>
+              <a:t>3</a:t>
+            </a:r>
+          </a:p>
+        </p:txBody>
+      </p:sp>
+      <p:cxnSp>
+        <p:nvCxnSpPr>
+          <p:cNvPr id="15" name="Connecteur droit avec flèche 14"/>
+          <p:cNvCxnSpPr>
+            <a:stCxn id="2" idx="2"/>
+          </p:cNvCxnSpPr>
+          <p:nvPr/>
+        </p:nvCxnSpPr>
+        <p:spPr>
+          <a:xfrm>
+            <a:off x="1000519" y="1114837"/>
+            <a:ext cx="1403315" cy="1481697"/>
+          </a:xfrm>
+          <a:prstGeom prst="straightConnector1">
+            <a:avLst/>
+          </a:prstGeom>
+          <a:ln w="38100">
+            <a:tailEnd type="triangle"/>
+          </a:ln>
+        </p:spPr>
+        <p:style>
+          <a:lnRef idx="3">
+            <a:schemeClr val="dk1"/>
+          </a:lnRef>
+          <a:fillRef idx="0">
+            <a:schemeClr val="dk1"/>
+          </a:fillRef>
+          <a:effectRef idx="2">
+            <a:schemeClr val="dk1"/>
+          </a:effectRef>
+          <a:fontRef idx="minor">
+            <a:schemeClr val="tx1"/>
+          </a:fontRef>
+        </p:style>
+      </p:cxnSp>
+      <p:sp>
+        <p:nvSpPr>
+          <p:cNvPr id="16" name="ZoneTexte 15"/>
+          <p:cNvSpPr txBox="1"/>
+          <p:nvPr/>
+        </p:nvSpPr>
+        <p:spPr>
+          <a:xfrm>
+            <a:off x="703917" y="1540528"/>
+            <a:ext cx="944785" cy="646331"/>
+          </a:xfrm>
+          <a:prstGeom prst="rect">
+            <a:avLst/>
+          </a:prstGeom>
+          <a:noFill/>
+        </p:spPr>
+        <p:txBody>
+          <a:bodyPr wrap="square" rtlCol="0">
+            <a:spAutoFit/>
+          </a:bodyPr>
+          <a:lstStyle/>
+          <a:p>
+            <a:r>
+              <a:rPr lang="fr-FR" sz="1200" dirty="0" smtClean="0"/>
+              <a:t>Polling </a:t>
+            </a:r>
+            <a:r>
+              <a:rPr lang="fr-FR" sz="1200" dirty="0" err="1" smtClean="0"/>
+              <a:t>every</a:t>
+            </a:r>
+            <a:r>
+              <a:rPr lang="fr-FR" sz="1200" dirty="0" smtClean="0"/>
+              <a:t> </a:t>
+            </a:r>
+            <a:r>
+              <a:rPr lang="fr-FR" sz="1200" dirty="0" smtClean="0"/>
+              <a:t>60s</a:t>
+            </a:r>
+            <a:br>
+              <a:rPr lang="fr-FR" sz="1200" dirty="0" smtClean="0"/>
+            </a:br>
+            <a:r>
+              <a:rPr lang="fr-FR" sz="1200" i="1" dirty="0" smtClean="0"/>
+              <a:t>2 slots</a:t>
+            </a:r>
+            <a:endParaRPr lang="fr-FR" sz="1200" i="1" dirty="0"/>
+          </a:p>
+        </p:txBody>
+      </p:sp>
+      <p:cxnSp>
+        <p:nvCxnSpPr>
+          <p:cNvPr id="17" name="Connecteur droit avec flèche 16"/>
+          <p:cNvCxnSpPr>
+            <a:stCxn id="2" idx="2"/>
+            <a:endCxn id="8" idx="1"/>
+          </p:cNvCxnSpPr>
+          <p:nvPr/>
+        </p:nvCxnSpPr>
+        <p:spPr>
+          <a:xfrm>
+            <a:off x="1000519" y="1114837"/>
+            <a:ext cx="1977471" cy="1481697"/>
+          </a:xfrm>
+          <a:prstGeom prst="straightConnector1">
+            <a:avLst/>
+          </a:prstGeom>
+          <a:ln w="38100">
+            <a:tailEnd type="triangle"/>
+          </a:ln>
+        </p:spPr>
+        <p:style>
+          <a:lnRef idx="3">
+            <a:schemeClr val="dk1"/>
+          </a:lnRef>
+          <a:fillRef idx="0">
+            <a:schemeClr val="dk1"/>
+          </a:fillRef>
+          <a:effectRef idx="2">
+            <a:schemeClr val="dk1"/>
+          </a:effectRef>
+          <a:fontRef idx="minor">
+            <a:schemeClr val="tx1"/>
+          </a:fontRef>
+        </p:style>
+      </p:cxnSp>
+      <p:sp>
+        <p:nvSpPr>
+          <p:cNvPr id="20" name="ZoneTexte 19"/>
+          <p:cNvSpPr txBox="1"/>
+          <p:nvPr/>
+        </p:nvSpPr>
+        <p:spPr>
+          <a:xfrm>
+            <a:off x="1561827" y="1044274"/>
+            <a:ext cx="909259" cy="646331"/>
+          </a:xfrm>
+          <a:prstGeom prst="rect">
+            <a:avLst/>
+          </a:prstGeom>
+          <a:noFill/>
+        </p:spPr>
+        <p:txBody>
+          <a:bodyPr wrap="square" rtlCol="0">
+            <a:spAutoFit/>
+          </a:bodyPr>
+          <a:lstStyle/>
+          <a:p>
+            <a:r>
+              <a:rPr lang="fr-FR" sz="1200" dirty="0" smtClean="0"/>
+              <a:t>Polling </a:t>
+            </a:r>
+            <a:r>
+              <a:rPr lang="fr-FR" sz="1200" dirty="0" err="1" smtClean="0"/>
+              <a:t>every</a:t>
+            </a:r>
+            <a:r>
+              <a:rPr lang="fr-FR" sz="1200" dirty="0" smtClean="0"/>
+              <a:t> </a:t>
+            </a:r>
+            <a:r>
+              <a:rPr lang="fr-FR" sz="1200" dirty="0" smtClean="0"/>
+              <a:t>10s</a:t>
+            </a:r>
+            <a:br>
+              <a:rPr lang="fr-FR" sz="1200" dirty="0" smtClean="0"/>
+            </a:br>
+            <a:r>
+              <a:rPr lang="fr-FR" sz="1200" i="1" dirty="0" smtClean="0"/>
+              <a:t>1 slot</a:t>
+            </a:r>
+            <a:endParaRPr lang="fr-FR" sz="1200" i="1" dirty="0"/>
+          </a:p>
+        </p:txBody>
+      </p:sp>
+      <p:cxnSp>
+        <p:nvCxnSpPr>
+          <p:cNvPr id="21" name="Connecteur droit avec flèche 20"/>
+          <p:cNvCxnSpPr>
+            <a:stCxn id="12" idx="2"/>
+            <a:endCxn id="8" idx="0"/>
+          </p:cNvCxnSpPr>
+          <p:nvPr/>
+        </p:nvCxnSpPr>
+        <p:spPr>
+          <a:xfrm flipH="1">
+            <a:off x="3171020" y="1114836"/>
+            <a:ext cx="26975" cy="1109890"/>
+          </a:xfrm>
+          <a:prstGeom prst="straightConnector1">
+            <a:avLst/>
+          </a:prstGeom>
+          <a:ln w="38100">
+            <a:tailEnd type="triangle"/>
+          </a:ln>
+        </p:spPr>
+        <p:style>
+          <a:lnRef idx="3">
+            <a:schemeClr val="dk1"/>
+          </a:lnRef>
+          <a:fillRef idx="0">
+            <a:schemeClr val="dk1"/>
+          </a:fillRef>
+          <a:effectRef idx="2">
+            <a:schemeClr val="dk1"/>
+          </a:effectRef>
+          <a:fontRef idx="minor">
+            <a:schemeClr val="tx1"/>
+          </a:fontRef>
+        </p:style>
+      </p:cxnSp>
+      <p:sp>
+        <p:nvSpPr>
+          <p:cNvPr id="24" name="ZoneTexte 23"/>
+          <p:cNvSpPr txBox="1"/>
+          <p:nvPr/>
+        </p:nvSpPr>
+        <p:spPr>
+          <a:xfrm>
+            <a:off x="2468162" y="1188629"/>
+            <a:ext cx="909259" cy="646331"/>
+          </a:xfrm>
+          <a:prstGeom prst="rect">
+            <a:avLst/>
+          </a:prstGeom>
+          <a:noFill/>
+        </p:spPr>
+        <p:txBody>
+          <a:bodyPr wrap="square" rtlCol="0">
+            <a:spAutoFit/>
+          </a:bodyPr>
+          <a:lstStyle/>
+          <a:p>
+            <a:r>
+              <a:rPr lang="fr-FR" sz="1200" dirty="0" smtClean="0"/>
+              <a:t>Polling </a:t>
+            </a:r>
+            <a:r>
+              <a:rPr lang="fr-FR" sz="1200" dirty="0" err="1" smtClean="0"/>
+              <a:t>every</a:t>
+            </a:r>
+            <a:r>
+              <a:rPr lang="fr-FR" sz="1200" dirty="0" smtClean="0"/>
+              <a:t> </a:t>
+            </a:r>
+            <a:r>
+              <a:rPr lang="fr-FR" sz="1200" dirty="0" smtClean="0"/>
+              <a:t>5s</a:t>
+            </a:r>
+            <a:br>
+              <a:rPr lang="fr-FR" sz="1200" dirty="0" smtClean="0"/>
+            </a:br>
+            <a:r>
+              <a:rPr lang="fr-FR" sz="1200" i="1" dirty="0" smtClean="0"/>
+              <a:t>100 slots</a:t>
+            </a:r>
+            <a:endParaRPr lang="fr-FR" sz="1200" i="1" dirty="0"/>
+          </a:p>
+        </p:txBody>
+      </p:sp>
+      <p:sp>
+        <p:nvSpPr>
+          <p:cNvPr id="25" name="ZoneTexte 24"/>
+          <p:cNvSpPr txBox="1"/>
+          <p:nvPr/>
+        </p:nvSpPr>
+        <p:spPr>
+          <a:xfrm>
+            <a:off x="4792033" y="1532318"/>
+            <a:ext cx="909259" cy="646331"/>
+          </a:xfrm>
+          <a:prstGeom prst="rect">
+            <a:avLst/>
+          </a:prstGeom>
+          <a:noFill/>
+        </p:spPr>
+        <p:txBody>
+          <a:bodyPr wrap="square" rtlCol="0">
+            <a:spAutoFit/>
+          </a:bodyPr>
+          <a:lstStyle/>
+          <a:p>
+            <a:r>
+              <a:rPr lang="fr-FR" sz="1200" dirty="0" smtClean="0"/>
+              <a:t>Polling </a:t>
+            </a:r>
+            <a:r>
+              <a:rPr lang="fr-FR" sz="1200" dirty="0" err="1" smtClean="0"/>
+              <a:t>every</a:t>
+            </a:r>
+            <a:r>
+              <a:rPr lang="fr-FR" sz="1200" dirty="0" smtClean="0"/>
+              <a:t> </a:t>
+            </a:r>
+            <a:r>
+              <a:rPr lang="fr-FR" sz="1200" dirty="0" smtClean="0"/>
+              <a:t>120s</a:t>
+            </a:r>
+            <a:br>
+              <a:rPr lang="fr-FR" sz="1200" dirty="0" smtClean="0"/>
+            </a:br>
+            <a:r>
+              <a:rPr lang="fr-FR" sz="1200" i="1" dirty="0" smtClean="0"/>
+              <a:t>10 slots</a:t>
+            </a:r>
+            <a:endParaRPr lang="fr-FR" sz="1200" i="1" dirty="0"/>
+          </a:p>
+        </p:txBody>
+      </p:sp>
+      <p:cxnSp>
+        <p:nvCxnSpPr>
+          <p:cNvPr id="26" name="Connecteur droit avec flèche 25"/>
+          <p:cNvCxnSpPr>
+            <a:stCxn id="13" idx="2"/>
+            <a:endCxn id="9" idx="0"/>
+          </p:cNvCxnSpPr>
+          <p:nvPr/>
+        </p:nvCxnSpPr>
+        <p:spPr>
+          <a:xfrm flipH="1">
+            <a:off x="3745176" y="1114835"/>
+            <a:ext cx="1650295" cy="1109891"/>
+          </a:xfrm>
+          <a:prstGeom prst="straightConnector1">
+            <a:avLst/>
+          </a:prstGeom>
+          <a:ln w="38100">
+            <a:tailEnd type="triangle"/>
+          </a:ln>
+        </p:spPr>
+        <p:style>
+          <a:lnRef idx="3">
+            <a:schemeClr val="dk1"/>
+          </a:lnRef>
+          <a:fillRef idx="0">
+            <a:schemeClr val="dk1"/>
+          </a:fillRef>
+          <a:effectRef idx="2">
+            <a:schemeClr val="dk1"/>
+          </a:effectRef>
+          <a:fontRef idx="minor">
+            <a:schemeClr val="tx1"/>
+          </a:fontRef>
+        </p:style>
+      </p:cxnSp>
+    </p:spTree>
+    <p:extLst>
+      <p:ext uri="{BB962C8B-B14F-4D97-AF65-F5344CB8AC3E}">
+        <p14:creationId xmlns:p14="http://schemas.microsoft.com/office/powerpoint/2010/main" val="1316404552"/>
       </p:ext>
     </p:extLst>
   </p:cSld>

</xml_diff>